<commit_message>
Cambios presentacion y MER
</commit_message>
<xml_diff>
--- a/presentacion/Agendados.pptx
+++ b/presentacion/Agendados.pptx
@@ -852,7 +852,7 @@
           <a:p>
             <a:fld id="{DF7915FD-CB15-468A-A937-895BBA11D09F}" type="datetimeFigureOut">
               <a:rPr lang="es-CO" smtClean="0"/>
-              <a:t>30/03/2025</a:t>
+              <a:t>5/06/2025</a:t>
             </a:fld>
             <a:endParaRPr lang="es-CO"/>
           </a:p>
@@ -894,7 +894,7 @@
           <a:p>
             <a:fld id="{D5778B1D-7479-48F2-A3D2-D4DDFB5AE135}" type="slidenum">
               <a:rPr lang="es-CO" smtClean="0"/>
-              <a:t>‹#›</a:t>
+              <a:t>‹Nº›</a:t>
             </a:fld>
             <a:endParaRPr lang="es-CO"/>
           </a:p>
@@ -1102,7 +1102,7 @@
           <a:p>
             <a:fld id="{DF7915FD-CB15-468A-A937-895BBA11D09F}" type="datetimeFigureOut">
               <a:rPr lang="es-CO" smtClean="0"/>
-              <a:t>30/03/2025</a:t>
+              <a:t>5/06/2025</a:t>
             </a:fld>
             <a:endParaRPr lang="es-CO"/>
           </a:p>
@@ -1144,7 +1144,7 @@
           <a:p>
             <a:fld id="{D5778B1D-7479-48F2-A3D2-D4DDFB5AE135}" type="slidenum">
               <a:rPr lang="es-CO" smtClean="0"/>
-              <a:t>‹#›</a:t>
+              <a:t>‹Nº›</a:t>
             </a:fld>
             <a:endParaRPr lang="es-CO"/>
           </a:p>
@@ -1415,7 +1415,7 @@
           <a:p>
             <a:fld id="{DF7915FD-CB15-468A-A937-895BBA11D09F}" type="datetimeFigureOut">
               <a:rPr lang="es-CO" smtClean="0"/>
-              <a:t>30/03/2025</a:t>
+              <a:t>5/06/2025</a:t>
             </a:fld>
             <a:endParaRPr lang="es-CO"/>
           </a:p>
@@ -1457,7 +1457,7 @@
           <a:p>
             <a:fld id="{D5778B1D-7479-48F2-A3D2-D4DDFB5AE135}" type="slidenum">
               <a:rPr lang="es-CO" smtClean="0"/>
-              <a:t>‹#›</a:t>
+              <a:t>‹Nº›</a:t>
             </a:fld>
             <a:endParaRPr lang="es-CO"/>
           </a:p>
@@ -1755,7 +1755,7 @@
           <a:p>
             <a:fld id="{DF7915FD-CB15-468A-A937-895BBA11D09F}" type="datetimeFigureOut">
               <a:rPr lang="es-CO" smtClean="0"/>
-              <a:t>30/03/2025</a:t>
+              <a:t>5/06/2025</a:t>
             </a:fld>
             <a:endParaRPr lang="es-CO"/>
           </a:p>
@@ -1797,7 +1797,7 @@
           <a:p>
             <a:fld id="{D5778B1D-7479-48F2-A3D2-D4DDFB5AE135}" type="slidenum">
               <a:rPr lang="es-CO" smtClean="0"/>
-              <a:t>‹#›</a:t>
+              <a:t>‹Nº›</a:t>
             </a:fld>
             <a:endParaRPr lang="es-CO"/>
           </a:p>
@@ -2068,7 +2068,7 @@
           <a:p>
             <a:fld id="{DF7915FD-CB15-468A-A937-895BBA11D09F}" type="datetimeFigureOut">
               <a:rPr lang="es-CO" smtClean="0"/>
-              <a:t>30/03/2025</a:t>
+              <a:t>5/06/2025</a:t>
             </a:fld>
             <a:endParaRPr lang="es-CO"/>
           </a:p>
@@ -2110,7 +2110,7 @@
           <a:p>
             <a:fld id="{D5778B1D-7479-48F2-A3D2-D4DDFB5AE135}" type="slidenum">
               <a:rPr lang="es-CO" smtClean="0"/>
-              <a:t>‹#›</a:t>
+              <a:t>‹Nº›</a:t>
             </a:fld>
             <a:endParaRPr lang="es-CO"/>
           </a:p>
@@ -2460,7 +2460,7 @@
           <a:p>
             <a:fld id="{DF7915FD-CB15-468A-A937-895BBA11D09F}" type="datetimeFigureOut">
               <a:rPr lang="es-CO" smtClean="0"/>
-              <a:t>30/03/2025</a:t>
+              <a:t>5/06/2025</a:t>
             </a:fld>
             <a:endParaRPr lang="es-CO"/>
           </a:p>
@@ -2502,7 +2502,7 @@
           <a:p>
             <a:fld id="{D5778B1D-7479-48F2-A3D2-D4DDFB5AE135}" type="slidenum">
               <a:rPr lang="es-CO" smtClean="0"/>
-              <a:t>‹#›</a:t>
+              <a:t>‹Nº›</a:t>
             </a:fld>
             <a:endParaRPr lang="es-CO"/>
           </a:p>
@@ -2628,7 +2628,7 @@
           <a:p>
             <a:fld id="{DF7915FD-CB15-468A-A937-895BBA11D09F}" type="datetimeFigureOut">
               <a:rPr lang="es-CO" smtClean="0"/>
-              <a:t>30/03/2025</a:t>
+              <a:t>5/06/2025</a:t>
             </a:fld>
             <a:endParaRPr lang="es-CO"/>
           </a:p>
@@ -2670,7 +2670,7 @@
           <a:p>
             <a:fld id="{D5778B1D-7479-48F2-A3D2-D4DDFB5AE135}" type="slidenum">
               <a:rPr lang="es-CO" smtClean="0"/>
-              <a:t>‹#›</a:t>
+              <a:t>‹Nº›</a:t>
             </a:fld>
             <a:endParaRPr lang="es-CO"/>
           </a:p>
@@ -2806,7 +2806,7 @@
           <a:p>
             <a:fld id="{DF7915FD-CB15-468A-A937-895BBA11D09F}" type="datetimeFigureOut">
               <a:rPr lang="es-CO" smtClean="0"/>
-              <a:t>30/03/2025</a:t>
+              <a:t>5/06/2025</a:t>
             </a:fld>
             <a:endParaRPr lang="es-CO"/>
           </a:p>
@@ -2848,7 +2848,7 @@
           <a:p>
             <a:fld id="{D5778B1D-7479-48F2-A3D2-D4DDFB5AE135}" type="slidenum">
               <a:rPr lang="es-CO" smtClean="0"/>
-              <a:t>‹#›</a:t>
+              <a:t>‹Nº›</a:t>
             </a:fld>
             <a:endParaRPr lang="es-CO"/>
           </a:p>
@@ -2980,7 +2980,7 @@
           <a:p>
             <a:fld id="{DF7915FD-CB15-468A-A937-895BBA11D09F}" type="datetimeFigureOut">
               <a:rPr lang="es-CO" smtClean="0"/>
-              <a:t>30/03/2025</a:t>
+              <a:t>5/06/2025</a:t>
             </a:fld>
             <a:endParaRPr lang="es-CO"/>
           </a:p>
@@ -3022,7 +3022,7 @@
           <a:p>
             <a:fld id="{D5778B1D-7479-48F2-A3D2-D4DDFB5AE135}" type="slidenum">
               <a:rPr lang="es-CO" smtClean="0"/>
-              <a:t>‹#›</a:t>
+              <a:t>‹Nº›</a:t>
             </a:fld>
             <a:endParaRPr lang="es-CO"/>
           </a:p>
@@ -3226,7 +3226,7 @@
           <a:p>
             <a:fld id="{DF7915FD-CB15-468A-A937-895BBA11D09F}" type="datetimeFigureOut">
               <a:rPr lang="es-CO" smtClean="0"/>
-              <a:t>30/03/2025</a:t>
+              <a:t>5/06/2025</a:t>
             </a:fld>
             <a:endParaRPr lang="es-CO"/>
           </a:p>
@@ -3268,7 +3268,7 @@
           <a:p>
             <a:fld id="{D5778B1D-7479-48F2-A3D2-D4DDFB5AE135}" type="slidenum">
               <a:rPr lang="es-CO" smtClean="0"/>
-              <a:t>‹#›</a:t>
+              <a:t>‹Nº›</a:t>
             </a:fld>
             <a:endParaRPr lang="es-CO"/>
           </a:p>
@@ -3455,7 +3455,7 @@
           <a:p>
             <a:fld id="{DF7915FD-CB15-468A-A937-895BBA11D09F}" type="datetimeFigureOut">
               <a:rPr lang="es-CO" smtClean="0"/>
-              <a:t>30/03/2025</a:t>
+              <a:t>5/06/2025</a:t>
             </a:fld>
             <a:endParaRPr lang="es-CO"/>
           </a:p>
@@ -3497,7 +3497,7 @@
           <a:p>
             <a:fld id="{D5778B1D-7479-48F2-A3D2-D4DDFB5AE135}" type="slidenum">
               <a:rPr lang="es-CO" smtClean="0"/>
-              <a:t>‹#›</a:t>
+              <a:t>‹Nº›</a:t>
             </a:fld>
             <a:endParaRPr lang="es-CO"/>
           </a:p>
@@ -3826,7 +3826,7 @@
           <a:p>
             <a:fld id="{DF7915FD-CB15-468A-A937-895BBA11D09F}" type="datetimeFigureOut">
               <a:rPr lang="es-CO" smtClean="0"/>
-              <a:t>30/03/2025</a:t>
+              <a:t>5/06/2025</a:t>
             </a:fld>
             <a:endParaRPr lang="es-CO"/>
           </a:p>
@@ -3868,7 +3868,7 @@
           <a:p>
             <a:fld id="{D5778B1D-7479-48F2-A3D2-D4DDFB5AE135}" type="slidenum">
               <a:rPr lang="es-CO" smtClean="0"/>
-              <a:t>‹#›</a:t>
+              <a:t>‹Nº›</a:t>
             </a:fld>
             <a:endParaRPr lang="es-CO"/>
           </a:p>
@@ -3948,7 +3948,7 @@
           <a:p>
             <a:fld id="{DF7915FD-CB15-468A-A937-895BBA11D09F}" type="datetimeFigureOut">
               <a:rPr lang="es-CO" smtClean="0"/>
-              <a:t>30/03/2025</a:t>
+              <a:t>5/06/2025</a:t>
             </a:fld>
             <a:endParaRPr lang="es-CO"/>
           </a:p>
@@ -3990,7 +3990,7 @@
           <a:p>
             <a:fld id="{D5778B1D-7479-48F2-A3D2-D4DDFB5AE135}" type="slidenum">
               <a:rPr lang="es-CO" smtClean="0"/>
-              <a:t>‹#›</a:t>
+              <a:t>‹Nº›</a:t>
             </a:fld>
             <a:endParaRPr lang="es-CO"/>
           </a:p>
@@ -4043,7 +4043,7 @@
           <a:p>
             <a:fld id="{DF7915FD-CB15-468A-A937-895BBA11D09F}" type="datetimeFigureOut">
               <a:rPr lang="es-CO" smtClean="0"/>
-              <a:t>30/03/2025</a:t>
+              <a:t>5/06/2025</a:t>
             </a:fld>
             <a:endParaRPr lang="es-CO"/>
           </a:p>
@@ -4085,7 +4085,7 @@
           <a:p>
             <a:fld id="{D5778B1D-7479-48F2-A3D2-D4DDFB5AE135}" type="slidenum">
               <a:rPr lang="es-CO" smtClean="0"/>
-              <a:t>‹#›</a:t>
+              <a:t>‹Nº›</a:t>
             </a:fld>
             <a:endParaRPr lang="es-CO"/>
           </a:p>
@@ -4296,7 +4296,7 @@
           <a:p>
             <a:fld id="{DF7915FD-CB15-468A-A937-895BBA11D09F}" type="datetimeFigureOut">
               <a:rPr lang="es-CO" smtClean="0"/>
-              <a:t>30/03/2025</a:t>
+              <a:t>5/06/2025</a:t>
             </a:fld>
             <a:endParaRPr lang="es-CO"/>
           </a:p>
@@ -4338,7 +4338,7 @@
           <a:p>
             <a:fld id="{D5778B1D-7479-48F2-A3D2-D4DDFB5AE135}" type="slidenum">
               <a:rPr lang="es-CO" smtClean="0"/>
-              <a:t>‹#›</a:t>
+              <a:t>‹Nº›</a:t>
             </a:fld>
             <a:endParaRPr lang="es-CO"/>
           </a:p>
@@ -4557,7 +4557,7 @@
           <a:p>
             <a:fld id="{DF7915FD-CB15-468A-A937-895BBA11D09F}" type="datetimeFigureOut">
               <a:rPr lang="es-CO" smtClean="0"/>
-              <a:t>30/03/2025</a:t>
+              <a:t>5/06/2025</a:t>
             </a:fld>
             <a:endParaRPr lang="es-CO"/>
           </a:p>
@@ -4599,7 +4599,7 @@
           <a:p>
             <a:fld id="{D5778B1D-7479-48F2-A3D2-D4DDFB5AE135}" type="slidenum">
               <a:rPr lang="es-CO" smtClean="0"/>
-              <a:t>‹#›</a:t>
+              <a:t>‹Nº›</a:t>
             </a:fld>
             <a:endParaRPr lang="es-CO"/>
           </a:p>
@@ -5298,7 +5298,7 @@
           <a:p>
             <a:fld id="{DF7915FD-CB15-468A-A937-895BBA11D09F}" type="datetimeFigureOut">
               <a:rPr lang="es-CO" smtClean="0"/>
-              <a:t>30/03/2025</a:t>
+              <a:t>5/06/2025</a:t>
             </a:fld>
             <a:endParaRPr lang="es-CO"/>
           </a:p>
@@ -5374,7 +5374,7 @@
           <a:p>
             <a:fld id="{D5778B1D-7479-48F2-A3D2-D4DDFB5AE135}" type="slidenum">
               <a:rPr lang="es-CO" smtClean="0"/>
-              <a:t>‹#›</a:t>
+              <a:t>‹Nº›</a:t>
             </a:fld>
             <a:endParaRPr lang="es-CO"/>
           </a:p>
@@ -5885,7 +5885,7 @@
           <a:lstStyle/>
           <a:p>
             <a:r>
-              <a:rPr lang="es-ES" b="1"/>
+              <a:rPr lang="es-ES" b="1" dirty="0"/>
               <a:t>Autores:</a:t>
             </a:r>
           </a:p>
@@ -5895,7 +5895,7 @@
               <a:buChar char="•"/>
             </a:pPr>
             <a:r>
-              <a:rPr lang="es-ES"/>
+              <a:rPr lang="es-ES" dirty="0"/>
               <a:t>Sergio David Ortiz Hernández</a:t>
             </a:r>
           </a:p>
@@ -5905,26 +5905,26 @@
               <a:buChar char="•"/>
             </a:pPr>
             <a:r>
-              <a:rPr lang="es-ES"/>
+              <a:rPr lang="es-ES" dirty="0"/>
               <a:t>David Alejandro Sandoval Rojas</a:t>
             </a:r>
           </a:p>
           <a:p>
-            <a:endParaRPr lang="es-ES"/>
-          </a:p>
-          <a:p>
-            <a:r>
-              <a:rPr lang="es-ES" b="1"/>
+            <a:endParaRPr lang="es-ES" dirty="0"/>
+          </a:p>
+          <a:p>
+            <a:r>
+              <a:rPr lang="es-ES" b="1" dirty="0"/>
               <a:t>Fecha de presentación:</a:t>
             </a:r>
             <a:br>
-              <a:rPr lang="es-ES"/>
+              <a:rPr lang="es-ES" dirty="0"/>
             </a:br>
             <a:r>
-              <a:rPr lang="es-ES"/>
-              <a:t>30/03/2025</a:t>
-            </a:r>
-            <a:endParaRPr lang="es-CO"/>
+              <a:rPr lang="es-ES" dirty="0"/>
+              <a:t>5/06/2025</a:t>
+            </a:r>
+            <a:endParaRPr lang="es-CO" dirty="0"/>
           </a:p>
         </p:txBody>
       </p:sp>
@@ -7094,7 +7094,7 @@
               <a:buNone/>
             </a:pPr>
             <a:r>
-              <a:rPr lang="es-ES" b="1"/>
+              <a:rPr lang="es-ES" b="1" dirty="0"/>
               <a:t>Funcionales</a:t>
             </a:r>
           </a:p>
@@ -7104,7 +7104,7 @@
               <a:buChar char="•"/>
             </a:pPr>
             <a:r>
-              <a:rPr lang="es-ES"/>
+              <a:rPr lang="es-ES" dirty="0"/>
               <a:t>Registrar y administrar estudiantes, profesores, aulas y materias.</a:t>
             </a:r>
           </a:p>
@@ -7114,7 +7114,7 @@
               <a:buChar char="•"/>
             </a:pPr>
             <a:r>
-              <a:rPr lang="es-ES"/>
+              <a:rPr lang="es-ES" dirty="0"/>
               <a:t>Generar horarios basados en restricciones y disponibilidad. </a:t>
             </a:r>
           </a:p>
@@ -7124,8 +7124,8 @@
               <a:buChar char="•"/>
             </a:pPr>
             <a:r>
-              <a:rPr lang="es-ES"/>
-              <a:t>Visualizar horarios por usuario(profesor/estudiante) y exportarlos.</a:t>
+              <a:rPr lang="es-ES" dirty="0"/>
+              <a:t>Visualizar horarios por usuario(profesor/estudiante/aula) y exportarlos.</a:t>
             </a:r>
           </a:p>
           <a:p>
@@ -7133,7 +7133,7 @@
               <a:buNone/>
             </a:pPr>
             <a:r>
-              <a:rPr lang="es-ES" b="1"/>
+              <a:rPr lang="es-ES" b="1" dirty="0"/>
               <a:t>No funcionales</a:t>
             </a:r>
           </a:p>
@@ -7143,7 +7143,7 @@
               <a:buChar char="•"/>
             </a:pPr>
             <a:r>
-              <a:rPr lang="es-ES"/>
+              <a:rPr lang="es-ES" dirty="0"/>
               <a:t>Interfaz fácil de usar.</a:t>
             </a:r>
           </a:p>
@@ -7153,7 +7153,7 @@
               <a:buChar char="•"/>
             </a:pPr>
             <a:r>
-              <a:rPr lang="es-ES"/>
+              <a:rPr lang="es-ES" dirty="0"/>
               <a:t>Eficiencia en la generación de horarios.</a:t>
             </a:r>
           </a:p>
@@ -7218,36 +7218,6 @@
           </a:p>
         </p:txBody>
       </p:sp>
-      <p:pic>
-        <p:nvPicPr>
-          <p:cNvPr id="5" name="Picture 4">
-            <a:extLst>
-              <a:ext uri="{FF2B5EF4-FFF2-40B4-BE49-F238E27FC236}">
-                <a16:creationId xmlns:a16="http://schemas.microsoft.com/office/drawing/2014/main" id="{D7250549-D81E-DC05-74DD-2F8795BDF831}"/>
-              </a:ext>
-            </a:extLst>
-          </p:cNvPr>
-          <p:cNvPicPr>
-            <a:picLocks noChangeAspect="1"/>
-          </p:cNvPicPr>
-          <p:nvPr/>
-        </p:nvPicPr>
-        <p:blipFill>
-          <a:blip r:embed="rId2"/>
-          <a:stretch>
-            <a:fillRect/>
-          </a:stretch>
-        </p:blipFill>
-        <p:spPr>
-          <a:xfrm>
-            <a:off x="677334" y="1336401"/>
-            <a:ext cx="6085711" cy="5137550"/>
-          </a:xfrm>
-          <a:prstGeom prst="rect">
-            <a:avLst/>
-          </a:prstGeom>
-        </p:spPr>
-      </p:pic>
       <p:sp>
         <p:nvSpPr>
           <p:cNvPr id="6" name="TextBox 5">
@@ -7280,7 +7250,7 @@
               <a:buNone/>
             </a:pPr>
             <a:r>
-              <a:rPr lang="es-ES" b="1"/>
+              <a:rPr lang="es-ES" b="1" dirty="0"/>
               <a:t>Objetivo:</a:t>
             </a:r>
           </a:p>
@@ -7289,13 +7259,49 @@
               <a:buNone/>
             </a:pPr>
             <a:r>
-              <a:rPr lang="es-ES"/>
+              <a:rPr lang="es-ES" dirty="0"/>
               <a:t>Diseñar una base de datos estructurada que permita estructurar muestro modelo y definir sus relaciones.</a:t>
             </a:r>
-            <a:endParaRPr lang="es-CO"/>
-          </a:p>
-        </p:txBody>
-      </p:sp>
+            <a:endParaRPr lang="es-CO" dirty="0"/>
+          </a:p>
+        </p:txBody>
+      </p:sp>
+      <p:pic>
+        <p:nvPicPr>
+          <p:cNvPr id="8" name="Imagen 7">
+            <a:extLst>
+              <a:ext uri="{FF2B5EF4-FFF2-40B4-BE49-F238E27FC236}">
+                <a16:creationId xmlns:a16="http://schemas.microsoft.com/office/drawing/2014/main" id="{BB20F204-CED2-2AFA-4C28-AE85FAC15873}"/>
+              </a:ext>
+            </a:extLst>
+          </p:cNvPr>
+          <p:cNvPicPr>
+            <a:picLocks noChangeAspect="1"/>
+          </p:cNvPicPr>
+          <p:nvPr/>
+        </p:nvPicPr>
+        <p:blipFill>
+          <a:blip r:embed="rId2">
+            <a:extLst>
+              <a:ext uri="{28A0092B-C50C-407E-A947-70E740481C1C}">
+                <a14:useLocalDpi xmlns:a14="http://schemas.microsoft.com/office/drawing/2010/main" val="0"/>
+              </a:ext>
+            </a:extLst>
+          </a:blip>
+          <a:stretch>
+            <a:fillRect/>
+          </a:stretch>
+        </p:blipFill>
+        <p:spPr>
+          <a:xfrm>
+            <a:off x="400002" y="1270000"/>
+            <a:ext cx="6538534" cy="5325199"/>
+          </a:xfrm>
+          <a:prstGeom prst="rect">
+            <a:avLst/>
+          </a:prstGeom>
+        </p:spPr>
+      </p:pic>
     </p:spTree>
     <p:extLst>
       <p:ext uri="{BB962C8B-B14F-4D97-AF65-F5344CB8AC3E}">

</xml_diff>